<commit_message>
add draft for tensorflow
</commit_message>
<xml_diff>
--- a/tensorflow_slides.pptx
+++ b/tensorflow_slides.pptx
@@ -5,12 +5,21 @@
     <p:sldMasterId id="2147483648" r:id="rId1"/>
   </p:sldMasterIdLst>
   <p:notesMasterIdLst>
-    <p:notesMasterId r:id="rId5"/>
+    <p:notesMasterId r:id="rId14"/>
   </p:notesMasterIdLst>
   <p:sldIdLst>
     <p:sldId id="256" r:id="rId2"/>
     <p:sldId id="257" r:id="rId3"/>
-    <p:sldId id="258" r:id="rId4"/>
+    <p:sldId id="265" r:id="rId4"/>
+    <p:sldId id="259" r:id="rId5"/>
+    <p:sldId id="261" r:id="rId6"/>
+    <p:sldId id="262" r:id="rId7"/>
+    <p:sldId id="266" r:id="rId8"/>
+    <p:sldId id="267" r:id="rId9"/>
+    <p:sldId id="268" r:id="rId10"/>
+    <p:sldId id="260" r:id="rId11"/>
+    <p:sldId id="263" r:id="rId12"/>
+    <p:sldId id="264" r:id="rId13"/>
   </p:sldIdLst>
   <p:sldSz cx="12192000" cy="6858000"/>
   <p:notesSz cx="6858000" cy="9144000"/>
@@ -294,7 +303,6 @@
               <a:rPr lang="en-US"/>
               <a:t>Fifth level</a:t>
             </a:r>
-            <a:endParaRPr lang="en-US"/>
           </a:p>
         </p:txBody>
       </p:sp>
@@ -3807,6 +3815,486 @@
 </p:sld>
 </file>
 
+<file path=ppt/slides/slide10.xml><?xml version="1.0" encoding="utf-8"?>
+<p:sld xmlns:a="http://schemas.openxmlformats.org/drawingml/2006/main" xmlns:r="http://schemas.openxmlformats.org/officeDocument/2006/relationships" xmlns:p="http://schemas.openxmlformats.org/presentationml/2006/main">
+  <p:cSld>
+    <p:spTree>
+      <p:nvGrpSpPr>
+        <p:cNvPr id="1" name=""/>
+        <p:cNvGrpSpPr/>
+        <p:nvPr/>
+      </p:nvGrpSpPr>
+      <p:grpSpPr>
+        <a:xfrm>
+          <a:off x="0" y="0"/>
+          <a:ext cx="0" cy="0"/>
+          <a:chOff x="0" y="0"/>
+          <a:chExt cx="0" cy="0"/>
+        </a:xfrm>
+      </p:grpSpPr>
+      <p:sp>
+        <p:nvSpPr>
+          <p:cNvPr id="2" name="Title 1"/>
+          <p:cNvSpPr>
+            <a:spLocks noGrp="1"/>
+          </p:cNvSpPr>
+          <p:nvPr>
+            <p:ph type="title"/>
+          </p:nvPr>
+        </p:nvSpPr>
+        <p:spPr/>
+        <p:txBody>
+          <a:bodyPr/>
+          <a:lstStyle/>
+          <a:p>
+            <a:r>
+              <a:rPr lang="en-US" dirty="0"/>
+              <a:t>Variable types</a:t>
+            </a:r>
+          </a:p>
+        </p:txBody>
+      </p:sp>
+      <p:sp>
+        <p:nvSpPr>
+          <p:cNvPr id="3" name="Content Placeholder 2"/>
+          <p:cNvSpPr>
+            <a:spLocks noGrp="1"/>
+          </p:cNvSpPr>
+          <p:nvPr>
+            <p:ph idx="1"/>
+          </p:nvPr>
+        </p:nvSpPr>
+        <p:spPr>
+          <a:xfrm>
+            <a:off x="1024128" y="2285999"/>
+            <a:ext cx="9720071" cy="4472609"/>
+          </a:xfrm>
+        </p:spPr>
+        <p:txBody>
+          <a:bodyPr>
+            <a:normAutofit lnSpcReduction="10000"/>
+          </a:bodyPr>
+          <a:lstStyle/>
+          <a:p>
+            <a:pPr marL="457200" indent="-457200">
+              <a:buFont typeface="+mj-lt"/>
+              <a:buAutoNum type="arabicPeriod"/>
+            </a:pPr>
+            <a:r>
+              <a:rPr lang="en-US" b="1" dirty="0">
+                <a:latin typeface="Courier New" panose="02070309020205020404" pitchFamily="49" charset="0"/>
+                <a:cs typeface="Courier New" panose="02070309020205020404" pitchFamily="49" charset="0"/>
+              </a:rPr>
+              <a:t>x = </a:t>
+            </a:r>
+            <a:r>
+              <a:rPr lang="en-US" b="1" dirty="0" err="1">
+                <a:latin typeface="Courier New" panose="02070309020205020404" pitchFamily="49" charset="0"/>
+                <a:cs typeface="Courier New" panose="02070309020205020404" pitchFamily="49" charset="0"/>
+              </a:rPr>
+              <a:t>tf.placeholder</a:t>
+            </a:r>
+            <a:r>
+              <a:rPr lang="en-US" b="1" dirty="0">
+                <a:latin typeface="Courier New" panose="02070309020205020404" pitchFamily="49" charset="0"/>
+                <a:cs typeface="Courier New" panose="02070309020205020404" pitchFamily="49" charset="0"/>
+              </a:rPr>
+              <a:t>(…)</a:t>
+            </a:r>
+          </a:p>
+          <a:p>
+            <a:pPr marL="457200" indent="-457200">
+              <a:buFont typeface="+mj-lt"/>
+              <a:buAutoNum type="arabicPeriod"/>
+            </a:pPr>
+            <a:r>
+              <a:rPr lang="en-US" b="1" dirty="0">
+                <a:latin typeface="Courier New" panose="02070309020205020404" pitchFamily="49" charset="0"/>
+                <a:cs typeface="Courier New" panose="02070309020205020404" pitchFamily="49" charset="0"/>
+              </a:rPr>
+              <a:t>W = </a:t>
+            </a:r>
+            <a:r>
+              <a:rPr lang="en-US" b="1" dirty="0" err="1">
+                <a:latin typeface="Courier New" panose="02070309020205020404" pitchFamily="49" charset="0"/>
+                <a:cs typeface="Courier New" panose="02070309020205020404" pitchFamily="49" charset="0"/>
+              </a:rPr>
+              <a:t>tf.Variable</a:t>
+            </a:r>
+            <a:r>
+              <a:rPr lang="en-US" b="1" dirty="0">
+                <a:latin typeface="Courier New" panose="02070309020205020404" pitchFamily="49" charset="0"/>
+                <a:cs typeface="Courier New" panose="02070309020205020404" pitchFamily="49" charset="0"/>
+              </a:rPr>
+              <a:t>(…)</a:t>
+            </a:r>
+          </a:p>
+          <a:p>
+            <a:pPr marL="457200" indent="-457200">
+              <a:buFont typeface="+mj-lt"/>
+              <a:buAutoNum type="arabicPeriod"/>
+            </a:pPr>
+            <a:r>
+              <a:rPr lang="en-US" b="1" dirty="0">
+                <a:latin typeface="Courier New" panose="02070309020205020404" pitchFamily="49" charset="0"/>
+                <a:cs typeface="Courier New" panose="02070309020205020404" pitchFamily="49" charset="0"/>
+              </a:rPr>
+              <a:t>b = </a:t>
+            </a:r>
+            <a:r>
+              <a:rPr lang="en-US" b="1" dirty="0" err="1">
+                <a:latin typeface="Courier New" panose="02070309020205020404" pitchFamily="49" charset="0"/>
+                <a:cs typeface="Courier New" panose="02070309020205020404" pitchFamily="49" charset="0"/>
+              </a:rPr>
+              <a:t>tf.Variable</a:t>
+            </a:r>
+            <a:r>
+              <a:rPr lang="en-US" b="1" dirty="0">
+                <a:latin typeface="Courier New" panose="02070309020205020404" pitchFamily="49" charset="0"/>
+                <a:cs typeface="Courier New" panose="02070309020205020404" pitchFamily="49" charset="0"/>
+              </a:rPr>
+              <a:t>(…)</a:t>
+            </a:r>
+          </a:p>
+          <a:p>
+            <a:pPr marL="457200" indent="-457200">
+              <a:buFont typeface="+mj-lt"/>
+              <a:buAutoNum type="arabicPeriod"/>
+            </a:pPr>
+            <a:endParaRPr lang="en-US" b="1" dirty="0">
+              <a:latin typeface="Courier New" panose="02070309020205020404" pitchFamily="49" charset="0"/>
+              <a:cs typeface="Courier New" panose="02070309020205020404" pitchFamily="49" charset="0"/>
+            </a:endParaRPr>
+          </a:p>
+          <a:p>
+            <a:pPr marL="457200" indent="-457200">
+              <a:buFont typeface="+mj-lt"/>
+              <a:buAutoNum type="arabicPeriod"/>
+            </a:pPr>
+            <a:endParaRPr lang="en-US" b="1" dirty="0">
+              <a:latin typeface="Courier New" panose="02070309020205020404" pitchFamily="49" charset="0"/>
+              <a:cs typeface="Courier New" panose="02070309020205020404" pitchFamily="49" charset="0"/>
+            </a:endParaRPr>
+          </a:p>
+          <a:p>
+            <a:pPr marL="457200" indent="-457200">
+              <a:buFont typeface="+mj-lt"/>
+              <a:buAutoNum type="arabicPeriod"/>
+            </a:pPr>
+            <a:endParaRPr lang="en-US" b="1" dirty="0">
+              <a:latin typeface="Courier New" panose="02070309020205020404" pitchFamily="49" charset="0"/>
+              <a:cs typeface="Courier New" panose="02070309020205020404" pitchFamily="49" charset="0"/>
+            </a:endParaRPr>
+          </a:p>
+          <a:p>
+            <a:pPr marL="457200" indent="-457200">
+              <a:buFont typeface="+mj-lt"/>
+              <a:buAutoNum type="arabicPeriod"/>
+            </a:pPr>
+            <a:endParaRPr lang="en-US" b="1" dirty="0">
+              <a:latin typeface="Courier New" panose="02070309020205020404" pitchFamily="49" charset="0"/>
+              <a:cs typeface="Courier New" panose="02070309020205020404" pitchFamily="49" charset="0"/>
+            </a:endParaRPr>
+          </a:p>
+          <a:p>
+            <a:pPr marL="457200" indent="-457200">
+              <a:buFont typeface="+mj-lt"/>
+              <a:buAutoNum type="arabicPeriod"/>
+            </a:pPr>
+            <a:endParaRPr lang="en-US" b="1" dirty="0">
+              <a:latin typeface="Courier New" panose="02070309020205020404" pitchFamily="49" charset="0"/>
+              <a:cs typeface="Courier New" panose="02070309020205020404" pitchFamily="49" charset="0"/>
+            </a:endParaRPr>
+          </a:p>
+          <a:p>
+            <a:pPr marL="457200" indent="-457200">
+              <a:buFont typeface="+mj-lt"/>
+              <a:buAutoNum type="arabicPeriod"/>
+            </a:pPr>
+            <a:endParaRPr lang="en-US" b="1" dirty="0">
+              <a:latin typeface="Courier New" panose="02070309020205020404" pitchFamily="49" charset="0"/>
+              <a:cs typeface="Courier New" panose="02070309020205020404" pitchFamily="49" charset="0"/>
+            </a:endParaRPr>
+          </a:p>
+          <a:p>
+            <a:pPr marL="457200" indent="-457200">
+              <a:buFont typeface="+mj-lt"/>
+              <a:buAutoNum type="arabicPeriod"/>
+            </a:pPr>
+            <a:r>
+              <a:rPr lang="en-US" b="1" dirty="0">
+                <a:latin typeface="Courier New" panose="02070309020205020404" pitchFamily="49" charset="0"/>
+                <a:cs typeface="Courier New" panose="02070309020205020404" pitchFamily="49" charset="0"/>
+              </a:rPr>
+              <a:t>y = </a:t>
+            </a:r>
+            <a:r>
+              <a:rPr lang="en-US" b="1" dirty="0" err="1">
+                <a:latin typeface="Courier New" panose="02070309020205020404" pitchFamily="49" charset="0"/>
+                <a:cs typeface="Courier New" panose="02070309020205020404" pitchFamily="49" charset="0"/>
+              </a:rPr>
+              <a:t>tf.nn.softmax</a:t>
+            </a:r>
+            <a:r>
+              <a:rPr lang="en-US" b="1" dirty="0">
+                <a:latin typeface="Courier New" panose="02070309020205020404" pitchFamily="49" charset="0"/>
+                <a:cs typeface="Courier New" panose="02070309020205020404" pitchFamily="49" charset="0"/>
+              </a:rPr>
+              <a:t>(</a:t>
+            </a:r>
+            <a:r>
+              <a:rPr lang="en-US" b="1" dirty="0" err="1">
+                <a:latin typeface="Courier New" panose="02070309020205020404" pitchFamily="49" charset="0"/>
+                <a:cs typeface="Courier New" panose="02070309020205020404" pitchFamily="49" charset="0"/>
+              </a:rPr>
+              <a:t>tf.matmul</a:t>
+            </a:r>
+            <a:r>
+              <a:rPr lang="en-US" b="1" dirty="0">
+                <a:latin typeface="Courier New" panose="02070309020205020404" pitchFamily="49" charset="0"/>
+                <a:cs typeface="Courier New" panose="02070309020205020404" pitchFamily="49" charset="0"/>
+              </a:rPr>
+              <a:t>(x, W) + b)</a:t>
+            </a:r>
+          </a:p>
+        </p:txBody>
+      </p:sp>
+      <p:pic>
+        <p:nvPicPr>
+          <p:cNvPr id="4" name="Picture 2" descr="https://www.tensorflow.org/images/softmax-regression-vectorequation.png"/>
+          <p:cNvPicPr>
+            <a:picLocks noChangeAspect="1" noChangeArrowheads="1"/>
+          </p:cNvPicPr>
+          <p:nvPr/>
+        </p:nvPicPr>
+        <p:blipFill>
+          <a:blip r:embed="rId2">
+            <a:extLst>
+              <a:ext uri="{28A0092B-C50C-407E-A947-70E740481C1C}">
+                <a14:useLocalDpi xmlns:a14="http://schemas.microsoft.com/office/drawing/2010/main" val="0"/>
+              </a:ext>
+            </a:extLst>
+          </a:blip>
+          <a:srcRect/>
+          <a:stretch>
+            <a:fillRect/>
+          </a:stretch>
+        </p:blipFill>
+        <p:spPr bwMode="auto">
+          <a:xfrm>
+            <a:off x="1304147" y="3799116"/>
+            <a:ext cx="9160030" cy="2233950"/>
+          </a:xfrm>
+          <a:prstGeom prst="rect">
+            <a:avLst/>
+          </a:prstGeom>
+          <a:noFill/>
+          <a:extLst>
+            <a:ext uri="{909E8E84-426E-40DD-AFC4-6F175D3DCCD1}">
+              <a14:hiddenFill xmlns:a14="http://schemas.microsoft.com/office/drawing/2010/main">
+                <a:solidFill>
+                  <a:srgbClr val="FFFFFF"/>
+                </a:solidFill>
+              </a14:hiddenFill>
+            </a:ext>
+          </a:extLst>
+        </p:spPr>
+      </p:pic>
+    </p:spTree>
+    <p:extLst>
+      <p:ext uri="{BB962C8B-B14F-4D97-AF65-F5344CB8AC3E}">
+        <p14:creationId xmlns:p14="http://schemas.microsoft.com/office/powerpoint/2010/main" val="3047115445"/>
+      </p:ext>
+    </p:extLst>
+  </p:cSld>
+  <p:clrMapOvr>
+    <a:masterClrMapping/>
+  </p:clrMapOvr>
+</p:sld>
+</file>
+
+<file path=ppt/slides/slide11.xml><?xml version="1.0" encoding="utf-8"?>
+<p:sld xmlns:a="http://schemas.openxmlformats.org/drawingml/2006/main" xmlns:r="http://schemas.openxmlformats.org/officeDocument/2006/relationships" xmlns:p="http://schemas.openxmlformats.org/presentationml/2006/main">
+  <p:cSld>
+    <p:spTree>
+      <p:nvGrpSpPr>
+        <p:cNvPr id="1" name=""/>
+        <p:cNvGrpSpPr/>
+        <p:nvPr/>
+      </p:nvGrpSpPr>
+      <p:grpSpPr>
+        <a:xfrm>
+          <a:off x="0" y="0"/>
+          <a:ext cx="0" cy="0"/>
+          <a:chOff x="0" y="0"/>
+          <a:chExt cx="0" cy="0"/>
+        </a:xfrm>
+      </p:grpSpPr>
+      <p:sp>
+        <p:nvSpPr>
+          <p:cNvPr id="4" name="Title 3"/>
+          <p:cNvSpPr>
+            <a:spLocks noGrp="1"/>
+          </p:cNvSpPr>
+          <p:nvPr>
+            <p:ph type="title"/>
+          </p:nvPr>
+        </p:nvSpPr>
+        <p:spPr/>
+        <p:txBody>
+          <a:bodyPr/>
+          <a:lstStyle/>
+          <a:p>
+            <a:r>
+              <a:rPr lang="en-US" dirty="0" err="1"/>
+              <a:t>Convolutionary</a:t>
+            </a:r>
+            <a:r>
+              <a:rPr lang="en-US" dirty="0"/>
+              <a:t> neural network</a:t>
+            </a:r>
+          </a:p>
+        </p:txBody>
+      </p:sp>
+      <p:sp>
+        <p:nvSpPr>
+          <p:cNvPr id="6" name="Text Placeholder 5"/>
+          <p:cNvSpPr>
+            <a:spLocks noGrp="1"/>
+          </p:cNvSpPr>
+          <p:nvPr>
+            <p:ph type="body" sz="half" idx="2"/>
+          </p:nvPr>
+        </p:nvSpPr>
+        <p:spPr/>
+        <p:txBody>
+          <a:bodyPr/>
+          <a:lstStyle/>
+          <a:p>
+            <a:endParaRPr lang="en-US"/>
+          </a:p>
+        </p:txBody>
+      </p:sp>
+      <p:pic>
+        <p:nvPicPr>
+          <p:cNvPr id="3074" name="Picture 2" descr="https://pbs.twimg.com/media/Cw9asbeUQAETYoC.png"/>
+          <p:cNvPicPr>
+            <a:picLocks noGrp="1" noChangeAspect="1" noChangeArrowheads="1"/>
+          </p:cNvPicPr>
+          <p:nvPr>
+            <p:ph type="pic" idx="1"/>
+          </p:nvPr>
+        </p:nvPicPr>
+        <p:blipFill>
+          <a:blip r:embed="rId2">
+            <a:extLst>
+              <a:ext uri="{28A0092B-C50C-407E-A947-70E740481C1C}">
+                <a14:useLocalDpi xmlns:a14="http://schemas.microsoft.com/office/drawing/2010/main" val="0"/>
+              </a:ext>
+            </a:extLst>
+          </a:blip>
+          <a:srcRect l="13" r="13"/>
+          <a:stretch>
+            <a:fillRect/>
+          </a:stretch>
+        </p:blipFill>
+        <p:spPr bwMode="auto">
+          <a:prstGeom prst="rect">
+            <a:avLst/>
+          </a:prstGeom>
+          <a:noFill/>
+          <a:extLst>
+            <a:ext uri="{909E8E84-426E-40DD-AFC4-6F175D3DCCD1}">
+              <a14:hiddenFill xmlns:a14="http://schemas.microsoft.com/office/drawing/2010/main">
+                <a:solidFill>
+                  <a:srgbClr val="FFFFFF"/>
+                </a:solidFill>
+              </a14:hiddenFill>
+            </a:ext>
+          </a:extLst>
+        </p:spPr>
+      </p:pic>
+    </p:spTree>
+    <p:extLst>
+      <p:ext uri="{BB962C8B-B14F-4D97-AF65-F5344CB8AC3E}">
+        <p14:creationId xmlns:p14="http://schemas.microsoft.com/office/powerpoint/2010/main" val="2998483394"/>
+      </p:ext>
+    </p:extLst>
+  </p:cSld>
+  <p:clrMapOvr>
+    <a:masterClrMapping/>
+  </p:clrMapOvr>
+</p:sld>
+</file>
+
+<file path=ppt/slides/slide12.xml><?xml version="1.0" encoding="utf-8"?>
+<p:sld xmlns:a="http://schemas.openxmlformats.org/drawingml/2006/main" xmlns:r="http://schemas.openxmlformats.org/officeDocument/2006/relationships" xmlns:p="http://schemas.openxmlformats.org/presentationml/2006/main">
+  <p:cSld>
+    <p:spTree>
+      <p:nvGrpSpPr>
+        <p:cNvPr id="1" name=""/>
+        <p:cNvGrpSpPr/>
+        <p:nvPr/>
+      </p:nvGrpSpPr>
+      <p:grpSpPr>
+        <a:xfrm>
+          <a:off x="0" y="0"/>
+          <a:ext cx="0" cy="0"/>
+          <a:chOff x="0" y="0"/>
+          <a:chExt cx="0" cy="0"/>
+        </a:xfrm>
+      </p:grpSpPr>
+      <p:sp>
+        <p:nvSpPr>
+          <p:cNvPr id="2" name="Title 1"/>
+          <p:cNvSpPr>
+            <a:spLocks noGrp="1"/>
+          </p:cNvSpPr>
+          <p:nvPr>
+            <p:ph type="title"/>
+          </p:nvPr>
+        </p:nvSpPr>
+        <p:spPr/>
+        <p:txBody>
+          <a:bodyPr/>
+          <a:lstStyle/>
+          <a:p>
+            <a:endParaRPr lang="en-US"/>
+          </a:p>
+        </p:txBody>
+      </p:sp>
+      <p:sp>
+        <p:nvSpPr>
+          <p:cNvPr id="3" name="Content Placeholder 2"/>
+          <p:cNvSpPr>
+            <a:spLocks noGrp="1"/>
+          </p:cNvSpPr>
+          <p:nvPr>
+            <p:ph idx="1"/>
+          </p:nvPr>
+        </p:nvSpPr>
+        <p:spPr/>
+        <p:txBody>
+          <a:bodyPr/>
+          <a:lstStyle/>
+          <a:p>
+            <a:endParaRPr lang="en-US"/>
+          </a:p>
+        </p:txBody>
+      </p:sp>
+    </p:spTree>
+    <p:extLst>
+      <p:ext uri="{BB962C8B-B14F-4D97-AF65-F5344CB8AC3E}">
+        <p14:creationId xmlns:p14="http://schemas.microsoft.com/office/powerpoint/2010/main" val="3912622898"/>
+      </p:ext>
+    </p:extLst>
+  </p:cSld>
+  <p:clrMapOvr>
+    <a:masterClrMapping/>
+  </p:clrMapOvr>
+</p:sld>
+</file>
+
 <file path=ppt/slides/slide2.xml><?xml version="1.0" encoding="utf-8"?>
 <p:sld xmlns:a="http://schemas.openxmlformats.org/drawingml/2006/main" xmlns:r="http://schemas.openxmlformats.org/officeDocument/2006/relationships" xmlns:p="http://schemas.openxmlformats.org/presentationml/2006/main">
   <p:cSld>
@@ -3922,7 +4410,6 @@
               <a:rPr lang="en-US" dirty="0"/>
               <a:t>Under the Apache 2.0 open source license on November 9, 2015</a:t>
             </a:r>
-            <a:endParaRPr lang="en-US" dirty="0"/>
           </a:p>
         </p:txBody>
       </p:sp>
@@ -4012,7 +4499,405 @@
           <a:p>
             <a:r>
               <a:rPr lang="en-US" dirty="0"/>
-              <a:t>Mechanics 101</a:t>
+              <a:t>Simple mathematical expression</a:t>
+            </a:r>
+          </a:p>
+        </p:txBody>
+      </p:sp>
+      <mc:AlternateContent xmlns:mc="http://schemas.openxmlformats.org/markup-compatibility/2006">
+        <mc:Choice xmlns:a14="http://schemas.microsoft.com/office/drawing/2010/main" Requires="a14">
+          <p:sp>
+            <p:nvSpPr>
+              <p:cNvPr id="4" name="TextBox 3"/>
+              <p:cNvSpPr txBox="1"/>
+              <p:nvPr/>
+            </p:nvSpPr>
+            <p:spPr>
+              <a:xfrm>
+                <a:off x="1024128" y="3264009"/>
+                <a:ext cx="8992925" cy="578363"/>
+              </a:xfrm>
+              <a:prstGeom prst="rect">
+                <a:avLst/>
+              </a:prstGeom>
+              <a:noFill/>
+            </p:spPr>
+            <p:txBody>
+              <a:bodyPr wrap="square" lIns="0" tIns="0" rIns="0" bIns="0" rtlCol="0">
+                <a:spAutoFit/>
+              </a:bodyPr>
+              <a:lstStyle/>
+              <a:p>
+                <a14:m>
+                  <m:oMathPara xmlns:m="http://schemas.openxmlformats.org/officeDocument/2006/math">
+                    <m:oMathParaPr>
+                      <m:jc m:val="centerGroup"/>
+                    </m:oMathParaPr>
+                    <m:oMath xmlns:m="http://schemas.openxmlformats.org/officeDocument/2006/math">
+                      <m:r>
+                        <a:rPr lang="en-US" sz="3600" b="0" i="1" smtClean="0">
+                          <a:latin typeface="Cambria Math" panose="02040503050406030204" pitchFamily="18" charset="0"/>
+                        </a:rPr>
+                        <m:t>𝑀𝑖𝑛𝑖𝑚𝑖𝑧</m:t>
+                      </m:r>
+                      <m:sSub>
+                        <m:sSubPr>
+                          <m:ctrlPr>
+                            <a:rPr lang="en-US" sz="3600" b="0" i="1" smtClean="0">
+                              <a:latin typeface="Cambria Math" panose="02040503050406030204" pitchFamily="18" charset="0"/>
+                            </a:rPr>
+                          </m:ctrlPr>
+                        </m:sSubPr>
+                        <m:e>
+                          <m:r>
+                            <a:rPr lang="en-US" sz="3600" b="0" i="1" smtClean="0">
+                              <a:latin typeface="Cambria Math" panose="02040503050406030204" pitchFamily="18" charset="0"/>
+                            </a:rPr>
+                            <m:t>𝑒</m:t>
+                          </m:r>
+                        </m:e>
+                        <m:sub>
+                          <m:r>
+                            <a:rPr lang="en-US" sz="3600" b="1" i="1" smtClean="0">
+                              <a:latin typeface="Cambria Math" panose="02040503050406030204" pitchFamily="18" charset="0"/>
+                            </a:rPr>
+                            <m:t>𝑾</m:t>
+                          </m:r>
+                          <m:r>
+                            <a:rPr lang="en-US" sz="3600" b="0" i="1" smtClean="0">
+                              <a:latin typeface="Cambria Math" panose="02040503050406030204" pitchFamily="18" charset="0"/>
+                            </a:rPr>
+                            <m:t>, </m:t>
+                          </m:r>
+                          <m:r>
+                            <a:rPr lang="en-US" sz="3600" b="1" i="1" smtClean="0">
+                              <a:latin typeface="Cambria Math" panose="02040503050406030204" pitchFamily="18" charset="0"/>
+                            </a:rPr>
+                            <m:t>𝒃</m:t>
+                          </m:r>
+                        </m:sub>
+                      </m:sSub>
+                      <m:r>
+                        <a:rPr lang="en-US" sz="3600" b="0" i="1" smtClean="0">
+                          <a:latin typeface="Cambria Math" panose="02040503050406030204" pitchFamily="18" charset="0"/>
+                        </a:rPr>
+                        <m:t> </m:t>
+                      </m:r>
+                      <m:r>
+                        <a:rPr lang="en-US" sz="3600" b="0" i="1" smtClean="0">
+                          <a:latin typeface="Cambria Math" panose="02040503050406030204" pitchFamily="18" charset="0"/>
+                        </a:rPr>
+                        <m:t>𝐽</m:t>
+                      </m:r>
+                      <m:d>
+                        <m:dPr>
+                          <m:ctrlPr>
+                            <a:rPr lang="en-US" sz="3600" b="0" i="1" smtClean="0">
+                              <a:latin typeface="Cambria Math" panose="02040503050406030204" pitchFamily="18" charset="0"/>
+                            </a:rPr>
+                          </m:ctrlPr>
+                        </m:dPr>
+                        <m:e>
+                          <m:r>
+                            <a:rPr lang="en-US" sz="3600" b="1" i="1" smtClean="0">
+                              <a:latin typeface="Cambria Math" panose="02040503050406030204" pitchFamily="18" charset="0"/>
+                            </a:rPr>
+                            <m:t>𝒙</m:t>
+                          </m:r>
+                        </m:e>
+                      </m:d>
+                      <m:r>
+                        <a:rPr lang="en-US" sz="3600" b="0" i="1" smtClean="0">
+                          <a:latin typeface="Cambria Math" panose="02040503050406030204" pitchFamily="18" charset="0"/>
+                        </a:rPr>
+                        <m:t>=</m:t>
+                      </m:r>
+                      <m:r>
+                        <a:rPr lang="en-US" sz="3600" b="0" i="1" smtClean="0">
+                          <a:latin typeface="Cambria Math" panose="02040503050406030204" pitchFamily="18" charset="0"/>
+                        </a:rPr>
+                        <m:t>𝐸</m:t>
+                      </m:r>
+                      <m:r>
+                        <a:rPr lang="en-US" sz="3600" b="0" i="1" smtClean="0">
+                          <a:latin typeface="Cambria Math" panose="02040503050406030204" pitchFamily="18" charset="0"/>
+                        </a:rPr>
+                        <m:t>(</m:t>
+                      </m:r>
+                      <m:r>
+                        <a:rPr lang="en-US" sz="3600" b="0" i="1" smtClean="0">
+                          <a:latin typeface="Cambria Math" panose="02040503050406030204" pitchFamily="18" charset="0"/>
+                        </a:rPr>
+                        <m:t>𝑓</m:t>
+                      </m:r>
+                      <m:d>
+                        <m:dPr>
+                          <m:ctrlPr>
+                            <a:rPr lang="en-US" sz="3600" b="0" i="1" smtClean="0">
+                              <a:latin typeface="Cambria Math" panose="02040503050406030204" pitchFamily="18" charset="0"/>
+                            </a:rPr>
+                          </m:ctrlPr>
+                        </m:dPr>
+                        <m:e>
+                          <m:r>
+                            <a:rPr lang="en-US" sz="3600" b="1" i="1" smtClean="0">
+                              <a:latin typeface="Cambria Math" panose="02040503050406030204" pitchFamily="18" charset="0"/>
+                            </a:rPr>
+                            <m:t>𝑾</m:t>
+                          </m:r>
+                          <m:r>
+                            <a:rPr lang="en-US" sz="3600" b="0" i="1" smtClean="0">
+                              <a:latin typeface="Cambria Math" panose="02040503050406030204" pitchFamily="18" charset="0"/>
+                            </a:rPr>
+                            <m:t>,</m:t>
+                          </m:r>
+                          <m:r>
+                            <a:rPr lang="en-US" sz="3600" b="1" i="1" smtClean="0">
+                              <a:latin typeface="Cambria Math" panose="02040503050406030204" pitchFamily="18" charset="0"/>
+                            </a:rPr>
+                            <m:t>𝒃</m:t>
+                          </m:r>
+                          <m:r>
+                            <a:rPr lang="en-US" sz="3600" b="0" i="1" smtClean="0">
+                              <a:latin typeface="Cambria Math" panose="02040503050406030204" pitchFamily="18" charset="0"/>
+                            </a:rPr>
+                            <m:t>,</m:t>
+                          </m:r>
+                          <m:r>
+                            <a:rPr lang="en-US" sz="3600" b="0" i="1" smtClean="0">
+                              <a:latin typeface="Cambria Math" panose="02040503050406030204" pitchFamily="18" charset="0"/>
+                            </a:rPr>
+                            <m:t>𝑥</m:t>
+                          </m:r>
+                        </m:e>
+                      </m:d>
+                      <m:r>
+                        <a:rPr lang="en-US" sz="3600" b="0" i="1" smtClean="0">
+                          <a:latin typeface="Cambria Math" panose="02040503050406030204" pitchFamily="18" charset="0"/>
+                        </a:rPr>
+                        <m:t>−</m:t>
+                      </m:r>
+                      <m:r>
+                        <a:rPr lang="en-US" sz="3600" b="0" i="1" smtClean="0">
+                          <a:latin typeface="Cambria Math" panose="02040503050406030204" pitchFamily="18" charset="0"/>
+                        </a:rPr>
+                        <m:t>𝑦</m:t>
+                      </m:r>
+                      <m:r>
+                        <a:rPr lang="en-US" sz="3600" b="0" i="1" smtClean="0">
+                          <a:latin typeface="Cambria Math" panose="02040503050406030204" pitchFamily="18" charset="0"/>
+                        </a:rPr>
+                        <m:t>)</m:t>
+                      </m:r>
+                    </m:oMath>
+                  </m:oMathPara>
+                </a14:m>
+                <a:endParaRPr lang="en-US" sz="3600" dirty="0"/>
+              </a:p>
+            </p:txBody>
+          </p:sp>
+        </mc:Choice>
+        <mc:Fallback>
+          <p:sp>
+            <p:nvSpPr>
+              <p:cNvPr id="4" name="TextBox 3"/>
+              <p:cNvSpPr txBox="1">
+                <a:spLocks noRot="1" noChangeAspect="1" noMove="1" noResize="1" noEditPoints="1" noAdjustHandles="1" noChangeArrowheads="1" noChangeShapeType="1" noTextEdit="1"/>
+              </p:cNvSpPr>
+              <p:nvPr/>
+            </p:nvSpPr>
+            <p:spPr>
+              <a:xfrm>
+                <a:off x="1024128" y="3264009"/>
+                <a:ext cx="8992925" cy="578363"/>
+              </a:xfrm>
+              <a:prstGeom prst="rect">
+                <a:avLst/>
+              </a:prstGeom>
+              <a:blipFill>
+                <a:blip r:embed="rId2"/>
+                <a:stretch>
+                  <a:fillRect/>
+                </a:stretch>
+              </a:blipFill>
+            </p:spPr>
+            <p:txBody>
+              <a:bodyPr/>
+              <a:lstStyle/>
+              <a:p>
+                <a:r>
+                  <a:rPr lang="en-US">
+                    <a:noFill/>
+                  </a:rPr>
+                  <a:t> </a:t>
+                </a:r>
+              </a:p>
+            </p:txBody>
+          </p:sp>
+        </mc:Fallback>
+      </mc:AlternateContent>
+    </p:spTree>
+    <p:extLst>
+      <p:ext uri="{BB962C8B-B14F-4D97-AF65-F5344CB8AC3E}">
+        <p14:creationId xmlns:p14="http://schemas.microsoft.com/office/powerpoint/2010/main" val="1264916258"/>
+      </p:ext>
+    </p:extLst>
+  </p:cSld>
+  <p:clrMapOvr>
+    <a:masterClrMapping/>
+  </p:clrMapOvr>
+</p:sld>
+</file>
+
+<file path=ppt/slides/slide4.xml><?xml version="1.0" encoding="utf-8"?>
+<p:sld xmlns:a="http://schemas.openxmlformats.org/drawingml/2006/main" xmlns:r="http://schemas.openxmlformats.org/officeDocument/2006/relationships" xmlns:p="http://schemas.openxmlformats.org/presentationml/2006/main">
+  <p:cSld>
+    <p:spTree>
+      <p:nvGrpSpPr>
+        <p:cNvPr id="1" name=""/>
+        <p:cNvGrpSpPr/>
+        <p:nvPr/>
+      </p:nvGrpSpPr>
+      <p:grpSpPr>
+        <a:xfrm>
+          <a:off x="0" y="0"/>
+          <a:ext cx="0" cy="0"/>
+          <a:chOff x="0" y="0"/>
+          <a:chExt cx="0" cy="0"/>
+        </a:xfrm>
+      </p:grpSpPr>
+      <p:sp>
+        <p:nvSpPr>
+          <p:cNvPr id="4" name="Title 3"/>
+          <p:cNvSpPr>
+            <a:spLocks noGrp="1"/>
+          </p:cNvSpPr>
+          <p:nvPr>
+            <p:ph type="title"/>
+          </p:nvPr>
+        </p:nvSpPr>
+        <p:spPr/>
+        <p:txBody>
+          <a:bodyPr/>
+          <a:lstStyle/>
+          <a:p>
+            <a:r>
+              <a:rPr lang="en-US" dirty="0" err="1"/>
+              <a:t>Mnist</a:t>
+            </a:r>
+            <a:r>
+              <a:rPr lang="en-US" dirty="0"/>
+              <a:t> dataset</a:t>
+            </a:r>
+          </a:p>
+        </p:txBody>
+      </p:sp>
+      <p:sp>
+        <p:nvSpPr>
+          <p:cNvPr id="6" name="Text Placeholder 5"/>
+          <p:cNvSpPr>
+            <a:spLocks noGrp="1"/>
+          </p:cNvSpPr>
+          <p:nvPr>
+            <p:ph type="body" sz="half" idx="2"/>
+          </p:nvPr>
+        </p:nvSpPr>
+        <p:spPr/>
+        <p:txBody>
+          <a:bodyPr/>
+          <a:lstStyle/>
+          <a:p>
+            <a:endParaRPr lang="en-US" dirty="0"/>
+          </a:p>
+        </p:txBody>
+      </p:sp>
+      <p:pic>
+        <p:nvPicPr>
+          <p:cNvPr id="1030" name="Picture 6" descr="http://tensorlayer.readthedocs.io/en/latest/_images/mnist.jpeg"/>
+          <p:cNvPicPr>
+            <a:picLocks noGrp="1" noChangeAspect="1" noChangeArrowheads="1"/>
+          </p:cNvPicPr>
+          <p:nvPr>
+            <p:ph type="pic" idx="1"/>
+          </p:nvPr>
+        </p:nvPicPr>
+        <p:blipFill>
+          <a:blip r:embed="rId2">
+            <a:extLst>
+              <a:ext uri="{28A0092B-C50C-407E-A947-70E740481C1C}">
+                <a14:useLocalDpi xmlns:a14="http://schemas.microsoft.com/office/drawing/2010/main" val="0"/>
+              </a:ext>
+            </a:extLst>
+          </a:blip>
+          <a:srcRect l="7856" r="7856"/>
+          <a:stretch>
+            <a:fillRect/>
+          </a:stretch>
+        </p:blipFill>
+        <p:spPr bwMode="auto">
+          <a:prstGeom prst="rect">
+            <a:avLst/>
+          </a:prstGeom>
+          <a:noFill/>
+          <a:extLst>
+            <a:ext uri="{909E8E84-426E-40DD-AFC4-6F175D3DCCD1}">
+              <a14:hiddenFill xmlns:a14="http://schemas.microsoft.com/office/drawing/2010/main">
+                <a:solidFill>
+                  <a:srgbClr val="FFFFFF"/>
+                </a:solidFill>
+              </a14:hiddenFill>
+            </a:ext>
+          </a:extLst>
+        </p:spPr>
+      </p:pic>
+    </p:spTree>
+    <p:extLst>
+      <p:ext uri="{BB962C8B-B14F-4D97-AF65-F5344CB8AC3E}">
+        <p14:creationId xmlns:p14="http://schemas.microsoft.com/office/powerpoint/2010/main" val="2774576548"/>
+      </p:ext>
+    </p:extLst>
+  </p:cSld>
+  <p:clrMapOvr>
+    <a:masterClrMapping/>
+  </p:clrMapOvr>
+</p:sld>
+</file>
+
+<file path=ppt/slides/slide5.xml><?xml version="1.0" encoding="utf-8"?>
+<p:sld xmlns:a="http://schemas.openxmlformats.org/drawingml/2006/main" xmlns:r="http://schemas.openxmlformats.org/officeDocument/2006/relationships" xmlns:p="http://schemas.openxmlformats.org/presentationml/2006/main">
+  <p:cSld>
+    <p:spTree>
+      <p:nvGrpSpPr>
+        <p:cNvPr id="1" name=""/>
+        <p:cNvGrpSpPr/>
+        <p:nvPr/>
+      </p:nvGrpSpPr>
+      <p:grpSpPr>
+        <a:xfrm>
+          <a:off x="0" y="0"/>
+          <a:ext cx="0" cy="0"/>
+          <a:chOff x="0" y="0"/>
+          <a:chExt cx="0" cy="0"/>
+        </a:xfrm>
+      </p:grpSpPr>
+      <p:sp>
+        <p:nvSpPr>
+          <p:cNvPr id="2" name="Title 1"/>
+          <p:cNvSpPr>
+            <a:spLocks noGrp="1"/>
+          </p:cNvSpPr>
+          <p:nvPr>
+            <p:ph type="title"/>
+          </p:nvPr>
+        </p:nvSpPr>
+        <p:spPr/>
+        <p:txBody>
+          <a:bodyPr/>
+          <a:lstStyle/>
+          <a:p>
+            <a:r>
+              <a:rPr lang="en-US" dirty="0"/>
+              <a:t>MNIST?</a:t>
             </a:r>
           </a:p>
         </p:txBody>
@@ -4037,8 +4922,44 @@
               <a:buAutoNum type="arabicPeriod"/>
             </a:pPr>
             <a:r>
+              <a:rPr lang="en-US" u="sng" dirty="0"/>
+              <a:t>M</a:t>
+            </a:r>
+            <a:r>
               <a:rPr lang="en-US" dirty="0"/>
-              <a:t>Build Graph</a:t>
+              <a:t>ixed </a:t>
+            </a:r>
+            <a:r>
+              <a:rPr lang="en-US" u="sng" dirty="0"/>
+              <a:t>N</a:t>
+            </a:r>
+            <a:r>
+              <a:rPr lang="en-US" dirty="0"/>
+              <a:t>ational </a:t>
+            </a:r>
+            <a:r>
+              <a:rPr lang="en-US" u="sng" dirty="0"/>
+              <a:t>I</a:t>
+            </a:r>
+            <a:r>
+              <a:rPr lang="en-US" dirty="0"/>
+              <a:t>nstitute of </a:t>
+            </a:r>
+            <a:r>
+              <a:rPr lang="en-US" u="sng" dirty="0"/>
+              <a:t>S</a:t>
+            </a:r>
+            <a:r>
+              <a:rPr lang="en-US" dirty="0"/>
+              <a:t>tandards and </a:t>
+            </a:r>
+            <a:r>
+              <a:rPr lang="en-US" u="sng" dirty="0"/>
+              <a:t>T</a:t>
+            </a:r>
+            <a:r>
+              <a:rPr lang="en-US" dirty="0"/>
+              <a:t>echnology database</a:t>
             </a:r>
           </a:p>
           <a:p>
@@ -4048,7 +4969,7 @@
             </a:pPr>
             <a:r>
               <a:rPr lang="en-US" dirty="0"/>
-              <a:t>Train the Model</a:t>
+              <a:t>Handwritten Digits</a:t>
             </a:r>
           </a:p>
           <a:p>
@@ -4058,15 +4979,510 @@
             </a:pPr>
             <a:r>
               <a:rPr lang="en-US" dirty="0"/>
-              <a:t>Evaluate the Model</a:t>
-            </a:r>
-          </a:p>
-        </p:txBody>
-      </p:sp>
+              <a:t>60,000 training images</a:t>
+            </a:r>
+          </a:p>
+          <a:p>
+            <a:pPr marL="457200" indent="-457200">
+              <a:buFont typeface="+mj-lt"/>
+              <a:buAutoNum type="arabicPeriod"/>
+            </a:pPr>
+            <a:r>
+              <a:rPr lang="en-US" dirty="0"/>
+              <a:t>10,000 test images</a:t>
+            </a:r>
+          </a:p>
+          <a:p>
+            <a:pPr marL="457200" indent="-457200">
+              <a:buFont typeface="+mj-lt"/>
+              <a:buAutoNum type="arabicPeriod"/>
+            </a:pPr>
+            <a:r>
+              <a:rPr lang="en-US" dirty="0"/>
+              <a:t>28 x 28 images</a:t>
+            </a:r>
+          </a:p>
+        </p:txBody>
+      </p:sp>
+      <p:grpSp>
+        <p:nvGrpSpPr>
+          <p:cNvPr id="5" name="Group 4"/>
+          <p:cNvGrpSpPr/>
+          <p:nvPr/>
+        </p:nvGrpSpPr>
+        <p:grpSpPr>
+          <a:xfrm>
+            <a:off x="7351644" y="2989410"/>
+            <a:ext cx="4490499" cy="3725467"/>
+            <a:chOff x="7065397" y="2785061"/>
+            <a:chExt cx="4490499" cy="3725467"/>
+          </a:xfrm>
+        </p:grpSpPr>
+        <p:pic>
+          <p:nvPicPr>
+            <p:cNvPr id="4100" name="Picture 4" descr="https://www.researchgate.net/profile/Kai_Labusch/publication/242300247/figure/fig1/AS:298429235384320@1448162482185/Figure-1-Samples-from-the-MNIST-data-set-of-handwritten-digits.png"/>
+            <p:cNvPicPr>
+              <a:picLocks noChangeAspect="1" noChangeArrowheads="1"/>
+            </p:cNvPicPr>
+            <p:nvPr/>
+          </p:nvPicPr>
+          <p:blipFill>
+            <a:blip r:embed="rId2">
+              <a:extLst>
+                <a:ext uri="{28A0092B-C50C-407E-A947-70E740481C1C}">
+                  <a14:useLocalDpi xmlns:a14="http://schemas.microsoft.com/office/drawing/2010/main" val="0"/>
+                </a:ext>
+              </a:extLst>
+            </a:blip>
+            <a:srcRect/>
+            <a:stretch>
+              <a:fillRect/>
+            </a:stretch>
+          </p:blipFill>
+          <p:spPr bwMode="auto">
+            <a:xfrm>
+              <a:off x="7258130" y="2935395"/>
+              <a:ext cx="4297766" cy="3575133"/>
+            </a:xfrm>
+            <a:prstGeom prst="rect">
+              <a:avLst/>
+            </a:prstGeom>
+            <a:noFill/>
+            <a:extLst>
+              <a:ext uri="{909E8E84-426E-40DD-AFC4-6F175D3DCCD1}">
+                <a14:hiddenFill xmlns:a14="http://schemas.microsoft.com/office/drawing/2010/main">
+                  <a:solidFill>
+                    <a:srgbClr val="FFFFFF"/>
+                  </a:solidFill>
+                </a14:hiddenFill>
+              </a:ext>
+            </a:extLst>
+          </p:spPr>
+        </p:pic>
+        <p:sp>
+          <p:nvSpPr>
+            <p:cNvPr id="4" name="Left Bracket 3"/>
+            <p:cNvSpPr/>
+            <p:nvPr/>
+          </p:nvSpPr>
+          <p:spPr>
+            <a:xfrm rot="5400000">
+              <a:off x="7675550" y="2441939"/>
+              <a:ext cx="86053" cy="772298"/>
+            </a:xfrm>
+            <a:prstGeom prst="leftBracket">
+              <a:avLst/>
+            </a:prstGeom>
+          </p:spPr>
+          <p:style>
+            <a:lnRef idx="1">
+              <a:schemeClr val="accent1"/>
+            </a:lnRef>
+            <a:fillRef idx="0">
+              <a:schemeClr val="accent1"/>
+            </a:fillRef>
+            <a:effectRef idx="0">
+              <a:schemeClr val="accent1"/>
+            </a:effectRef>
+            <a:fontRef idx="minor">
+              <a:schemeClr val="tx1"/>
+            </a:fontRef>
+          </p:style>
+          <p:txBody>
+            <a:bodyPr vert="vert270" rtlCol="0" anchor="ctr"/>
+            <a:lstStyle/>
+            <a:p>
+              <a:pPr algn="ctr"/>
+              <a:r>
+                <a:rPr lang="en-US" dirty="0"/>
+                <a:t>28</a:t>
+              </a:r>
+            </a:p>
+            <a:p>
+              <a:pPr algn="ctr"/>
+              <a:endParaRPr lang="en-US" dirty="0"/>
+            </a:p>
+            <a:p>
+              <a:pPr algn="ctr"/>
+              <a:endParaRPr lang="en-US" dirty="0"/>
+            </a:p>
+          </p:txBody>
+        </p:sp>
+        <p:sp>
+          <p:nvSpPr>
+            <p:cNvPr id="7" name="Left Bracket 6"/>
+            <p:cNvSpPr/>
+            <p:nvPr/>
+          </p:nvSpPr>
+          <p:spPr>
+            <a:xfrm>
+              <a:off x="7065397" y="3024087"/>
+              <a:ext cx="86053" cy="772298"/>
+            </a:xfrm>
+            <a:prstGeom prst="leftBracket">
+              <a:avLst/>
+            </a:prstGeom>
+          </p:spPr>
+          <p:style>
+            <a:lnRef idx="1">
+              <a:schemeClr val="accent1"/>
+            </a:lnRef>
+            <a:fillRef idx="0">
+              <a:schemeClr val="accent1"/>
+            </a:fillRef>
+            <a:effectRef idx="0">
+              <a:schemeClr val="accent1"/>
+            </a:effectRef>
+            <a:fontRef idx="minor">
+              <a:schemeClr val="tx1"/>
+            </a:fontRef>
+          </p:style>
+          <p:txBody>
+            <a:bodyPr vert="vert270" rtlCol="0" anchor="ctr"/>
+            <a:lstStyle/>
+            <a:p>
+              <a:pPr algn="ctr"/>
+              <a:r>
+                <a:rPr lang="en-US" dirty="0"/>
+                <a:t>28</a:t>
+              </a:r>
+            </a:p>
+            <a:p>
+              <a:pPr algn="ctr"/>
+              <a:endParaRPr lang="en-US" dirty="0"/>
+            </a:p>
+            <a:p>
+              <a:pPr algn="ctr"/>
+              <a:endParaRPr lang="en-US" dirty="0"/>
+            </a:p>
+          </p:txBody>
+        </p:sp>
+      </p:grpSp>
     </p:spTree>
     <p:extLst>
       <p:ext uri="{BB962C8B-B14F-4D97-AF65-F5344CB8AC3E}">
-        <p14:creationId xmlns:p14="http://schemas.microsoft.com/office/powerpoint/2010/main" val="4259347418"/>
+        <p14:creationId xmlns:p14="http://schemas.microsoft.com/office/powerpoint/2010/main" val="1640784154"/>
+      </p:ext>
+    </p:extLst>
+  </p:cSld>
+  <p:clrMapOvr>
+    <a:masterClrMapping/>
+  </p:clrMapOvr>
+</p:sld>
+</file>
+
+<file path=ppt/slides/slide6.xml><?xml version="1.0" encoding="utf-8"?>
+<p:sld xmlns:a="http://schemas.openxmlformats.org/drawingml/2006/main" xmlns:r="http://schemas.openxmlformats.org/officeDocument/2006/relationships" xmlns:p="http://schemas.openxmlformats.org/presentationml/2006/main">
+  <p:cSld>
+    <p:spTree>
+      <p:nvGrpSpPr>
+        <p:cNvPr id="1" name=""/>
+        <p:cNvGrpSpPr/>
+        <p:nvPr/>
+      </p:nvGrpSpPr>
+      <p:grpSpPr>
+        <a:xfrm>
+          <a:off x="0" y="0"/>
+          <a:ext cx="0" cy="0"/>
+          <a:chOff x="0" y="0"/>
+          <a:chExt cx="0" cy="0"/>
+        </a:xfrm>
+      </p:grpSpPr>
+      <p:sp>
+        <p:nvSpPr>
+          <p:cNvPr id="4" name="Title 3"/>
+          <p:cNvSpPr>
+            <a:spLocks noGrp="1"/>
+          </p:cNvSpPr>
+          <p:nvPr>
+            <p:ph type="title"/>
+          </p:nvPr>
+        </p:nvSpPr>
+        <p:spPr/>
+        <p:txBody>
+          <a:bodyPr/>
+          <a:lstStyle/>
+          <a:p>
+            <a:r>
+              <a:rPr lang="en-US" dirty="0"/>
+              <a:t>Linear regression</a:t>
+            </a:r>
+          </a:p>
+        </p:txBody>
+      </p:sp>
+      <p:sp>
+        <p:nvSpPr>
+          <p:cNvPr id="6" name="Text Placeholder 5"/>
+          <p:cNvSpPr>
+            <a:spLocks noGrp="1"/>
+          </p:cNvSpPr>
+          <p:nvPr>
+            <p:ph type="body" sz="half" idx="2"/>
+          </p:nvPr>
+        </p:nvSpPr>
+        <p:spPr/>
+        <p:txBody>
+          <a:bodyPr/>
+          <a:lstStyle/>
+          <a:p>
+            <a:endParaRPr lang="en-US"/>
+          </a:p>
+        </p:txBody>
+      </p:sp>
+      <p:pic>
+        <p:nvPicPr>
+          <p:cNvPr id="2050" name="Picture 2" descr="https://i.ytimg.com/vi/0T0z8d0_aY4/maxresdefault.jpg"/>
+          <p:cNvPicPr>
+            <a:picLocks noGrp="1" noChangeAspect="1" noChangeArrowheads="1"/>
+          </p:cNvPicPr>
+          <p:nvPr>
+            <p:ph type="pic" idx="1"/>
+          </p:nvPr>
+        </p:nvPicPr>
+        <p:blipFill rotWithShape="1">
+          <a:blip r:embed="rId2">
+            <a:extLst>
+              <a:ext uri="{28A0092B-C50C-407E-A947-70E740481C1C}">
+                <a14:useLocalDpi xmlns:a14="http://schemas.microsoft.com/office/drawing/2010/main" val="0"/>
+              </a:ext>
+            </a:extLst>
+          </a:blip>
+          <a:srcRect t="30959" b="22153"/>
+          <a:stretch/>
+        </p:blipFill>
+        <p:spPr bwMode="auto">
+          <a:prstGeom prst="rect">
+            <a:avLst/>
+          </a:prstGeom>
+          <a:noFill/>
+          <a:extLst>
+            <a:ext uri="{909E8E84-426E-40DD-AFC4-6F175D3DCCD1}">
+              <a14:hiddenFill xmlns:a14="http://schemas.microsoft.com/office/drawing/2010/main">
+                <a:solidFill>
+                  <a:srgbClr val="FFFFFF"/>
+                </a:solidFill>
+              </a14:hiddenFill>
+            </a:ext>
+          </a:extLst>
+        </p:spPr>
+      </p:pic>
+    </p:spTree>
+    <p:extLst>
+      <p:ext uri="{BB962C8B-B14F-4D97-AF65-F5344CB8AC3E}">
+        <p14:creationId xmlns:p14="http://schemas.microsoft.com/office/powerpoint/2010/main" val="1265586028"/>
+      </p:ext>
+    </p:extLst>
+  </p:cSld>
+  <p:clrMapOvr>
+    <a:masterClrMapping/>
+  </p:clrMapOvr>
+</p:sld>
+</file>
+
+<file path=ppt/slides/slide7.xml><?xml version="1.0" encoding="utf-8"?>
+<p:sld xmlns:a="http://schemas.openxmlformats.org/drawingml/2006/main" xmlns:r="http://schemas.openxmlformats.org/officeDocument/2006/relationships" xmlns:p="http://schemas.openxmlformats.org/presentationml/2006/main">
+  <p:cSld>
+    <p:spTree>
+      <p:nvGrpSpPr>
+        <p:cNvPr id="1" name=""/>
+        <p:cNvGrpSpPr/>
+        <p:nvPr/>
+      </p:nvGrpSpPr>
+      <p:grpSpPr>
+        <a:xfrm>
+          <a:off x="0" y="0"/>
+          <a:ext cx="0" cy="0"/>
+          <a:chOff x="0" y="0"/>
+          <a:chExt cx="0" cy="0"/>
+        </a:xfrm>
+      </p:grpSpPr>
+      <p:pic>
+        <p:nvPicPr>
+          <p:cNvPr id="5122" name="Picture 2" descr="https://www.tensorflow.org/images/softmax-regression-scalargraph.png"/>
+          <p:cNvPicPr>
+            <a:picLocks noChangeAspect="1" noChangeArrowheads="1"/>
+          </p:cNvPicPr>
+          <p:nvPr/>
+        </p:nvPicPr>
+        <p:blipFill>
+          <a:blip r:embed="rId2">
+            <a:extLst>
+              <a:ext uri="{28A0092B-C50C-407E-A947-70E740481C1C}">
+                <a14:useLocalDpi xmlns:a14="http://schemas.microsoft.com/office/drawing/2010/main" val="0"/>
+              </a:ext>
+            </a:extLst>
+          </a:blip>
+          <a:srcRect/>
+          <a:stretch>
+            <a:fillRect/>
+          </a:stretch>
+        </p:blipFill>
+        <p:spPr bwMode="auto">
+          <a:xfrm>
+            <a:off x="1057984" y="1416279"/>
+            <a:ext cx="10076033" cy="4023854"/>
+          </a:xfrm>
+          <a:prstGeom prst="rect">
+            <a:avLst/>
+          </a:prstGeom>
+          <a:noFill/>
+          <a:extLst>
+            <a:ext uri="{909E8E84-426E-40DD-AFC4-6F175D3DCCD1}">
+              <a14:hiddenFill xmlns:a14="http://schemas.microsoft.com/office/drawing/2010/main">
+                <a:solidFill>
+                  <a:srgbClr val="FFFFFF"/>
+                </a:solidFill>
+              </a14:hiddenFill>
+            </a:ext>
+          </a:extLst>
+        </p:spPr>
+      </p:pic>
+    </p:spTree>
+    <p:extLst>
+      <p:ext uri="{BB962C8B-B14F-4D97-AF65-F5344CB8AC3E}">
+        <p14:creationId xmlns:p14="http://schemas.microsoft.com/office/powerpoint/2010/main" val="3783764653"/>
+      </p:ext>
+    </p:extLst>
+  </p:cSld>
+  <p:clrMapOvr>
+    <a:masterClrMapping/>
+  </p:clrMapOvr>
+</p:sld>
+</file>
+
+<file path=ppt/slides/slide8.xml><?xml version="1.0" encoding="utf-8"?>
+<p:sld xmlns:a="http://schemas.openxmlformats.org/drawingml/2006/main" xmlns:r="http://schemas.openxmlformats.org/officeDocument/2006/relationships" xmlns:p="http://schemas.openxmlformats.org/presentationml/2006/main">
+  <p:cSld>
+    <p:spTree>
+      <p:nvGrpSpPr>
+        <p:cNvPr id="1" name=""/>
+        <p:cNvGrpSpPr/>
+        <p:nvPr/>
+      </p:nvGrpSpPr>
+      <p:grpSpPr>
+        <a:xfrm>
+          <a:off x="0" y="0"/>
+          <a:ext cx="0" cy="0"/>
+          <a:chOff x="0" y="0"/>
+          <a:chExt cx="0" cy="0"/>
+        </a:xfrm>
+      </p:grpSpPr>
+      <p:pic>
+        <p:nvPicPr>
+          <p:cNvPr id="6154" name="Picture 10" descr="https://www.tensorflow.org/images/softmax-regression-scalarequation.png"/>
+          <p:cNvPicPr>
+            <a:picLocks noChangeAspect="1" noChangeArrowheads="1"/>
+          </p:cNvPicPr>
+          <p:nvPr/>
+        </p:nvPicPr>
+        <p:blipFill>
+          <a:blip r:embed="rId2">
+            <a:extLst>
+              <a:ext uri="{28A0092B-C50C-407E-A947-70E740481C1C}">
+                <a14:useLocalDpi xmlns:a14="http://schemas.microsoft.com/office/drawing/2010/main" val="0"/>
+              </a:ext>
+            </a:extLst>
+          </a:blip>
+          <a:srcRect/>
+          <a:stretch>
+            <a:fillRect/>
+          </a:stretch>
+        </p:blipFill>
+        <p:spPr bwMode="auto">
+          <a:xfrm>
+            <a:off x="1057984" y="2278391"/>
+            <a:ext cx="10076033" cy="2301219"/>
+          </a:xfrm>
+          <a:prstGeom prst="rect">
+            <a:avLst/>
+          </a:prstGeom>
+          <a:noFill/>
+          <a:extLst>
+            <a:ext uri="{909E8E84-426E-40DD-AFC4-6F175D3DCCD1}">
+              <a14:hiddenFill xmlns:a14="http://schemas.microsoft.com/office/drawing/2010/main">
+                <a:solidFill>
+                  <a:srgbClr val="FFFFFF"/>
+                </a:solidFill>
+              </a14:hiddenFill>
+            </a:ext>
+          </a:extLst>
+        </p:spPr>
+      </p:pic>
+    </p:spTree>
+    <p:extLst>
+      <p:ext uri="{BB962C8B-B14F-4D97-AF65-F5344CB8AC3E}">
+        <p14:creationId xmlns:p14="http://schemas.microsoft.com/office/powerpoint/2010/main" val="1588507869"/>
+      </p:ext>
+    </p:extLst>
+  </p:cSld>
+  <p:clrMapOvr>
+    <a:masterClrMapping/>
+  </p:clrMapOvr>
+</p:sld>
+</file>
+
+<file path=ppt/slides/slide9.xml><?xml version="1.0" encoding="utf-8"?>
+<p:sld xmlns:a="http://schemas.openxmlformats.org/drawingml/2006/main" xmlns:r="http://schemas.openxmlformats.org/officeDocument/2006/relationships" xmlns:p="http://schemas.openxmlformats.org/presentationml/2006/main">
+  <p:cSld>
+    <p:spTree>
+      <p:nvGrpSpPr>
+        <p:cNvPr id="1" name=""/>
+        <p:cNvGrpSpPr/>
+        <p:nvPr/>
+      </p:nvGrpSpPr>
+      <p:grpSpPr>
+        <a:xfrm>
+          <a:off x="0" y="0"/>
+          <a:ext cx="0" cy="0"/>
+          <a:chOff x="0" y="0"/>
+          <a:chExt cx="0" cy="0"/>
+        </a:xfrm>
+      </p:grpSpPr>
+      <p:pic>
+        <p:nvPicPr>
+          <p:cNvPr id="7170" name="Picture 2" descr="https://www.tensorflow.org/images/softmax-regression-vectorequation.png"/>
+          <p:cNvPicPr>
+            <a:picLocks noChangeAspect="1" noChangeArrowheads="1"/>
+          </p:cNvPicPr>
+          <p:nvPr/>
+        </p:nvPicPr>
+        <p:blipFill>
+          <a:blip r:embed="rId2">
+            <a:extLst>
+              <a:ext uri="{28A0092B-C50C-407E-A947-70E740481C1C}">
+                <a14:useLocalDpi xmlns:a14="http://schemas.microsoft.com/office/drawing/2010/main" val="0"/>
+              </a:ext>
+            </a:extLst>
+          </a:blip>
+          <a:srcRect/>
+          <a:stretch>
+            <a:fillRect/>
+          </a:stretch>
+        </p:blipFill>
+        <p:spPr bwMode="auto">
+          <a:xfrm>
+            <a:off x="1057984" y="2199534"/>
+            <a:ext cx="10076033" cy="2457345"/>
+          </a:xfrm>
+          <a:prstGeom prst="rect">
+            <a:avLst/>
+          </a:prstGeom>
+          <a:noFill/>
+          <a:extLst>
+            <a:ext uri="{909E8E84-426E-40DD-AFC4-6F175D3DCCD1}">
+              <a14:hiddenFill xmlns:a14="http://schemas.microsoft.com/office/drawing/2010/main">
+                <a:solidFill>
+                  <a:srgbClr val="FFFFFF"/>
+                </a:solidFill>
+              </a14:hiddenFill>
+            </a:ext>
+          </a:extLst>
+        </p:spPr>
+      </p:pic>
+    </p:spTree>
+    <p:extLst>
+      <p:ext uri="{BB962C8B-B14F-4D97-AF65-F5344CB8AC3E}">
+        <p14:creationId xmlns:p14="http://schemas.microsoft.com/office/powerpoint/2010/main" val="3900725373"/>
       </p:ext>
     </p:extLst>
   </p:cSld>

</xml_diff>